<commit_message>
220623 layout2 한명/두명인 경우
</commit_message>
<xml_diff>
--- a/양식1.pptx
+++ b/양식1.pptx
@@ -8,21 +8,21 @@
     <p:notesMasterId r:id="rId17"/>
   </p:notesMasterIdLst>
   <p:sldIdLst>
-    <p:sldId id="256" r:id="rId2"/>
-    <p:sldId id="257" r:id="rId3"/>
-    <p:sldId id="258" r:id="rId4"/>
-    <p:sldId id="259" r:id="rId5"/>
-    <p:sldId id="260" r:id="rId6"/>
-    <p:sldId id="261" r:id="rId7"/>
-    <p:sldId id="262" r:id="rId8"/>
-    <p:sldId id="263" r:id="rId9"/>
-    <p:sldId id="264" r:id="rId10"/>
-    <p:sldId id="265" r:id="rId11"/>
-    <p:sldId id="266" r:id="rId12"/>
-    <p:sldId id="267" r:id="rId13"/>
-    <p:sldId id="268" r:id="rId14"/>
-    <p:sldId id="269" r:id="rId15"/>
-    <p:sldId id="270" r:id="rId16"/>
+    <p:sldId id="258" r:id="rId2"/>
+    <p:sldId id="259" r:id="rId3"/>
+    <p:sldId id="260" r:id="rId4"/>
+    <p:sldId id="261" r:id="rId5"/>
+    <p:sldId id="262" r:id="rId6"/>
+    <p:sldId id="263" r:id="rId7"/>
+    <p:sldId id="264" r:id="rId8"/>
+    <p:sldId id="265" r:id="rId9"/>
+    <p:sldId id="266" r:id="rId10"/>
+    <p:sldId id="267" r:id="rId11"/>
+    <p:sldId id="268" r:id="rId12"/>
+    <p:sldId id="269" r:id="rId13"/>
+    <p:sldId id="270" r:id="rId14"/>
+    <p:sldId id="271" r:id="rId15"/>
+    <p:sldId id="272" r:id="rId16"/>
   </p:sldIdLst>
   <p:sldSz cx="12192000" cy="6858000"/>
   <p:notesSz cx="6858000" cy="9144000"/>
@@ -211,7 +211,7 @@
           <a:p>
             <a:fld id="{19F13344-D54A-4D86-A5D2-FD81DD084F9F}" type="datetimeFigureOut">
               <a:rPr lang="ko-KR" altLang="en-US" smtClean="0"/>
-              <a:t>2022-06-16</a:t>
+              <a:t>2022-06-23</a:t>
             </a:fld>
             <a:endParaRPr lang="ko-KR" altLang="en-US"/>
           </a:p>
@@ -625,7 +625,7 @@
           <a:p>
             <a:fld id="{22AABA13-C4C2-407F-881C-FF016485D499}" type="datetime1">
               <a:rPr lang="ko-KR" altLang="en-US" smtClean="0"/>
-              <a:t>2022-06-16</a:t>
+              <a:t>2022-06-23</a:t>
             </a:fld>
             <a:endParaRPr lang="ko-KR" altLang="en-US"/>
           </a:p>
@@ -823,7 +823,7 @@
           <a:p>
             <a:fld id="{8AC93597-FD44-4047-B60D-64BFDFC9AB07}" type="datetime1">
               <a:rPr lang="ko-KR" altLang="en-US" smtClean="0"/>
-              <a:t>2022-06-16</a:t>
+              <a:t>2022-06-23</a:t>
             </a:fld>
             <a:endParaRPr lang="ko-KR" altLang="en-US"/>
           </a:p>
@@ -1031,7 +1031,7 @@
           <a:p>
             <a:fld id="{D8E00E24-022F-4624-AA34-8D2AEF725D1C}" type="datetime1">
               <a:rPr lang="ko-KR" altLang="en-US" smtClean="0"/>
-              <a:t>2022-06-16</a:t>
+              <a:t>2022-06-23</a:t>
             </a:fld>
             <a:endParaRPr lang="ko-KR" altLang="en-US"/>
           </a:p>
@@ -1229,7 +1229,7 @@
           <a:p>
             <a:fld id="{912C9545-3AFA-49E2-BC82-B75E4BA824F3}" type="datetime1">
               <a:rPr lang="ko-KR" altLang="en-US" smtClean="0"/>
-              <a:t>2022-06-16</a:t>
+              <a:t>2022-06-23</a:t>
             </a:fld>
             <a:endParaRPr lang="ko-KR" altLang="en-US"/>
           </a:p>
@@ -1504,7 +1504,7 @@
           <a:p>
             <a:fld id="{EC8CC216-051A-4DD0-A620-105A76326424}" type="datetime1">
               <a:rPr lang="ko-KR" altLang="en-US" smtClean="0"/>
-              <a:t>2022-06-16</a:t>
+              <a:t>2022-06-23</a:t>
             </a:fld>
             <a:endParaRPr lang="ko-KR" altLang="en-US"/>
           </a:p>
@@ -1769,7 +1769,7 @@
           <a:p>
             <a:fld id="{1512F9A8-1B10-4C2A-942C-2744240A590B}" type="datetime1">
               <a:rPr lang="ko-KR" altLang="en-US" smtClean="0"/>
-              <a:t>2022-06-16</a:t>
+              <a:t>2022-06-23</a:t>
             </a:fld>
             <a:endParaRPr lang="ko-KR" altLang="en-US"/>
           </a:p>
@@ -2181,7 +2181,7 @@
           <a:p>
             <a:fld id="{0A88B85E-2249-4498-94C2-C222D4624F98}" type="datetime1">
               <a:rPr lang="ko-KR" altLang="en-US" smtClean="0"/>
-              <a:t>2022-06-16</a:t>
+              <a:t>2022-06-23</a:t>
             </a:fld>
             <a:endParaRPr lang="ko-KR" altLang="en-US"/>
           </a:p>
@@ -2322,7 +2322,7 @@
           <a:p>
             <a:fld id="{A1964E3E-3AA3-4898-BCA0-E169713F8536}" type="datetime1">
               <a:rPr lang="ko-KR" altLang="en-US" smtClean="0"/>
-              <a:t>2022-06-16</a:t>
+              <a:t>2022-06-23</a:t>
             </a:fld>
             <a:endParaRPr lang="ko-KR" altLang="en-US"/>
           </a:p>
@@ -2435,7 +2435,7 @@
           <a:p>
             <a:fld id="{9D96AE18-149E-4A5A-A0A1-0CEC34EF8C04}" type="datetime1">
               <a:rPr lang="ko-KR" altLang="en-US" smtClean="0"/>
-              <a:t>2022-06-16</a:t>
+              <a:t>2022-06-23</a:t>
             </a:fld>
             <a:endParaRPr lang="ko-KR" altLang="en-US"/>
           </a:p>
@@ -2746,7 +2746,7 @@
           <a:p>
             <a:fld id="{A5B10253-1DB3-444D-AEEF-3EA2D297323B}" type="datetime1">
               <a:rPr lang="ko-KR" altLang="en-US" smtClean="0"/>
-              <a:t>2022-06-16</a:t>
+              <a:t>2022-06-23</a:t>
             </a:fld>
             <a:endParaRPr lang="ko-KR" altLang="en-US"/>
           </a:p>
@@ -3034,7 +3034,7 @@
           <a:p>
             <a:fld id="{08BDEA48-095C-4FAD-82C6-00E50F2A1619}" type="datetime1">
               <a:rPr lang="ko-KR" altLang="en-US" smtClean="0"/>
-              <a:t>2022-06-16</a:t>
+              <a:t>2022-06-23</a:t>
             </a:fld>
             <a:endParaRPr lang="ko-KR" altLang="en-US"/>
           </a:p>
@@ -3275,7 +3275,7 @@
           <a:p>
             <a:fld id="{3411749E-CD33-477B-B369-C97AB55A631D}" type="datetime1">
               <a:rPr lang="ko-KR" altLang="en-US" smtClean="0"/>
-              <a:t>2022-06-16</a:t>
+              <a:t>2022-06-23</a:t>
             </a:fld>
             <a:endParaRPr lang="ko-KR" altLang="en-US"/>
           </a:p>
@@ -3745,53 +3745,6 @@
           </a:p>
         </p:txBody>
       </p:sp>
-      <p:pic>
-        <p:nvPicPr>
-          <p:cNvPr id="3" name="logo" descr="2조원 파급 효과 내고도 매 맞은 &amp;#39;인천관광공사&amp;#39; - 위키리크스한국">
-            <a:extLst>
-              <a:ext uri="{FF2B5EF4-FFF2-40B4-BE49-F238E27FC236}">
-                <a16:creationId xmlns:a16="http://schemas.microsoft.com/office/drawing/2014/main" id="{E2D33970-FE8B-4A0A-AD13-6F0D6F5FB73A}"/>
-              </a:ext>
-            </a:extLst>
-          </p:cNvPr>
-          <p:cNvPicPr>
-            <a:picLocks noChangeAspect="1" noChangeArrowheads="1"/>
-          </p:cNvPicPr>
-          <p:nvPr/>
-        </p:nvPicPr>
-        <p:blipFill>
-          <a:blip r:embed="rId2">
-            <a:extLst>
-              <a:ext uri="{28A0092B-C50C-407E-A947-70E740481C1C}">
-                <a14:useLocalDpi xmlns:a14="http://schemas.microsoft.com/office/drawing/2010/main" val="0"/>
-              </a:ext>
-            </a:extLst>
-          </a:blip>
-          <a:srcRect/>
-          <a:stretch>
-            <a:fillRect/>
-          </a:stretch>
-        </p:blipFill>
-        <p:spPr bwMode="auto">
-          <a:xfrm>
-            <a:off x="3238499" y="95880"/>
-            <a:ext cx="5715000" cy="2219325"/>
-          </a:xfrm>
-          <a:prstGeom prst="rect">
-            <a:avLst/>
-          </a:prstGeom>
-          <a:noFill/>
-          <a:extLst>
-            <a:ext uri="{909E8E84-426E-40DD-AFC4-6F175D3DCCD1}">
-              <a14:hiddenFill xmlns:a14="http://schemas.microsoft.com/office/drawing/2010/main">
-                <a:solidFill>
-                  <a:srgbClr val="FFFFFF"/>
-                </a:solidFill>
-              </a14:hiddenFill>
-            </a:ext>
-          </a:extLst>
-        </p:spPr>
-      </p:pic>
       <p:sp>
         <p:nvSpPr>
           <p:cNvPr id="2" name="name">
@@ -3820,6 +3773,7 @@
           </a:bodyPr>
           <a:lstStyle/>
           <a:p>
+            <a:pPr algn="ctr"/>
             <a:r>
               <a:rPr lang="ko-KR" altLang="en-US" sz="16800" b="1" spc="5000" dirty="0">
                 <a:solidFill>
@@ -3889,12 +3843,31 @@
           </a:p>
         </p:txBody>
       </p:sp>
+      <p:pic>
+        <p:nvPicPr>
+          <p:cNvPr id="9" name="Picture 8" descr="image.jpeg"/>
+          <p:cNvPicPr>
+            <a:picLocks noChangeAspect="1"/>
+          </p:cNvPicPr>
+          <p:nvPr/>
+        </p:nvPicPr>
+        <p:blipFill>
+          <a:blip r:embed="rId2"/>
+          <a:stretch>
+            <a:fillRect/>
+          </a:stretch>
+        </p:blipFill>
+        <p:spPr>
+          <a:xfrm>
+            <a:off x="3238499" y="95880"/>
+            <a:ext cx="5715000" cy="2219325"/>
+          </a:xfrm>
+          <a:prstGeom prst="rect">
+            <a:avLst/>
+          </a:prstGeom>
+        </p:spPr>
+      </p:pic>
     </p:spTree>
-    <p:extLst>
-      <p:ext uri="{BB962C8B-B14F-4D97-AF65-F5344CB8AC3E}">
-        <p14:creationId xmlns:p14="http://schemas.microsoft.com/office/powerpoint/2010/main" val="1142651298"/>
-      </p:ext>
-    </p:extLst>
   </p:cSld>
   <p:clrMapOvr>
     <a:masterClrMapping/>
@@ -3971,53 +3944,6 @@
           </a:p>
         </p:txBody>
       </p:sp>
-      <p:pic>
-        <p:nvPicPr>
-          <p:cNvPr id="3" name="logo" descr="2조원 파급 효과 내고도 매 맞은 &amp;#39;인천관광공사&amp;#39; - 위키리크스한국">
-            <a:extLst>
-              <a:ext uri="{FF2B5EF4-FFF2-40B4-BE49-F238E27FC236}">
-                <a16:creationId xmlns:a16="http://schemas.microsoft.com/office/drawing/2014/main" id="{E2D33970-FE8B-4A0A-AD13-6F0D6F5FB73A}"/>
-              </a:ext>
-            </a:extLst>
-          </p:cNvPr>
-          <p:cNvPicPr>
-            <a:picLocks noChangeAspect="1" noChangeArrowheads="1"/>
-          </p:cNvPicPr>
-          <p:nvPr/>
-        </p:nvPicPr>
-        <p:blipFill>
-          <a:blip r:embed="rId2">
-            <a:extLst>
-              <a:ext uri="{28A0092B-C50C-407E-A947-70E740481C1C}">
-                <a14:useLocalDpi xmlns:a14="http://schemas.microsoft.com/office/drawing/2010/main" val="0"/>
-              </a:ext>
-            </a:extLst>
-          </a:blip>
-          <a:srcRect/>
-          <a:stretch>
-            <a:fillRect/>
-          </a:stretch>
-        </p:blipFill>
-        <p:spPr bwMode="auto">
-          <a:xfrm>
-            <a:off x="3238499" y="95880"/>
-            <a:ext cx="5715000" cy="2219325"/>
-          </a:xfrm>
-          <a:prstGeom prst="rect">
-            <a:avLst/>
-          </a:prstGeom>
-          <a:noFill/>
-          <a:extLst>
-            <a:ext uri="{909E8E84-426E-40DD-AFC4-6F175D3DCCD1}">
-              <a14:hiddenFill xmlns:a14="http://schemas.microsoft.com/office/drawing/2010/main">
-                <a:solidFill>
-                  <a:srgbClr val="FFFFFF"/>
-                </a:solidFill>
-              </a14:hiddenFill>
-            </a:ext>
-          </a:extLst>
-        </p:spPr>
-      </p:pic>
       <p:sp>
         <p:nvSpPr>
           <p:cNvPr id="2" name="name">
@@ -4046,6 +3972,7 @@
           </a:bodyPr>
           <a:lstStyle/>
           <a:p>
+            <a:pPr algn="ctr"/>
             <a:r>
               <a:rPr lang="ko-KR" altLang="en-US" sz="16800" b="1" spc="5000" dirty="0">
                 <a:solidFill>
@@ -4115,10 +4042,34 @@
           </a:p>
         </p:txBody>
       </p:sp>
+      <p:pic>
+        <p:nvPicPr>
+          <p:cNvPr id="9" name="Picture 8" descr="image.jpeg"/>
+          <p:cNvPicPr>
+            <a:picLocks noChangeAspect="1"/>
+          </p:cNvPicPr>
+          <p:nvPr/>
+        </p:nvPicPr>
+        <p:blipFill>
+          <a:blip r:embed="rId2"/>
+          <a:stretch>
+            <a:fillRect/>
+          </a:stretch>
+        </p:blipFill>
+        <p:spPr>
+          <a:xfrm>
+            <a:off x="3238499" y="95880"/>
+            <a:ext cx="5715000" cy="2219325"/>
+          </a:xfrm>
+          <a:prstGeom prst="rect">
+            <a:avLst/>
+          </a:prstGeom>
+        </p:spPr>
+      </p:pic>
     </p:spTree>
     <p:extLst>
       <p:ext uri="{BB962C8B-B14F-4D97-AF65-F5344CB8AC3E}">
-        <p14:creationId xmlns:p14="http://schemas.microsoft.com/office/powerpoint/2010/main" val="1884241942"/>
+        <p14:creationId xmlns:p14="http://schemas.microsoft.com/office/powerpoint/2010/main" val="2259382357"/>
       </p:ext>
     </p:extLst>
   </p:cSld>
@@ -4197,53 +4148,6 @@
           </a:p>
         </p:txBody>
       </p:sp>
-      <p:pic>
-        <p:nvPicPr>
-          <p:cNvPr id="3" name="logo" descr="2조원 파급 효과 내고도 매 맞은 &amp;#39;인천관광공사&amp;#39; - 위키리크스한국">
-            <a:extLst>
-              <a:ext uri="{FF2B5EF4-FFF2-40B4-BE49-F238E27FC236}">
-                <a16:creationId xmlns:a16="http://schemas.microsoft.com/office/drawing/2014/main" id="{E2D33970-FE8B-4A0A-AD13-6F0D6F5FB73A}"/>
-              </a:ext>
-            </a:extLst>
-          </p:cNvPr>
-          <p:cNvPicPr>
-            <a:picLocks noChangeAspect="1" noChangeArrowheads="1"/>
-          </p:cNvPicPr>
-          <p:nvPr/>
-        </p:nvPicPr>
-        <p:blipFill>
-          <a:blip r:embed="rId2">
-            <a:extLst>
-              <a:ext uri="{28A0092B-C50C-407E-A947-70E740481C1C}">
-                <a14:useLocalDpi xmlns:a14="http://schemas.microsoft.com/office/drawing/2010/main" val="0"/>
-              </a:ext>
-            </a:extLst>
-          </a:blip>
-          <a:srcRect/>
-          <a:stretch>
-            <a:fillRect/>
-          </a:stretch>
-        </p:blipFill>
-        <p:spPr bwMode="auto">
-          <a:xfrm>
-            <a:off x="3238499" y="95880"/>
-            <a:ext cx="5715000" cy="2219325"/>
-          </a:xfrm>
-          <a:prstGeom prst="rect">
-            <a:avLst/>
-          </a:prstGeom>
-          <a:noFill/>
-          <a:extLst>
-            <a:ext uri="{909E8E84-426E-40DD-AFC4-6F175D3DCCD1}">
-              <a14:hiddenFill xmlns:a14="http://schemas.microsoft.com/office/drawing/2010/main">
-                <a:solidFill>
-                  <a:srgbClr val="FFFFFF"/>
-                </a:solidFill>
-              </a14:hiddenFill>
-            </a:ext>
-          </a:extLst>
-        </p:spPr>
-      </p:pic>
       <p:sp>
         <p:nvSpPr>
           <p:cNvPr id="2" name="name">
@@ -4272,6 +4176,7 @@
           </a:bodyPr>
           <a:lstStyle/>
           <a:p>
+            <a:pPr algn="ctr"/>
             <a:r>
               <a:rPr lang="ko-KR" altLang="en-US" sz="16800" b="1" spc="5000" dirty="0">
                 <a:solidFill>
@@ -4341,10 +4246,34 @@
           </a:p>
         </p:txBody>
       </p:sp>
+      <p:pic>
+        <p:nvPicPr>
+          <p:cNvPr id="9" name="Picture 8" descr="image.jpeg"/>
+          <p:cNvPicPr>
+            <a:picLocks noChangeAspect="1"/>
+          </p:cNvPicPr>
+          <p:nvPr/>
+        </p:nvPicPr>
+        <p:blipFill>
+          <a:blip r:embed="rId2"/>
+          <a:stretch>
+            <a:fillRect/>
+          </a:stretch>
+        </p:blipFill>
+        <p:spPr>
+          <a:xfrm>
+            <a:off x="3238499" y="95880"/>
+            <a:ext cx="5715000" cy="2219325"/>
+          </a:xfrm>
+          <a:prstGeom prst="rect">
+            <a:avLst/>
+          </a:prstGeom>
+        </p:spPr>
+      </p:pic>
     </p:spTree>
     <p:extLst>
       <p:ext uri="{BB962C8B-B14F-4D97-AF65-F5344CB8AC3E}">
-        <p14:creationId xmlns:p14="http://schemas.microsoft.com/office/powerpoint/2010/main" val="3065046218"/>
+        <p14:creationId xmlns:p14="http://schemas.microsoft.com/office/powerpoint/2010/main" val="4250634451"/>
       </p:ext>
     </p:extLst>
   </p:cSld>
@@ -4423,53 +4352,6 @@
           </a:p>
         </p:txBody>
       </p:sp>
-      <p:pic>
-        <p:nvPicPr>
-          <p:cNvPr id="3" name="logo" descr="2조원 파급 효과 내고도 매 맞은 &amp;#39;인천관광공사&amp;#39; - 위키리크스한국">
-            <a:extLst>
-              <a:ext uri="{FF2B5EF4-FFF2-40B4-BE49-F238E27FC236}">
-                <a16:creationId xmlns:a16="http://schemas.microsoft.com/office/drawing/2014/main" id="{E2D33970-FE8B-4A0A-AD13-6F0D6F5FB73A}"/>
-              </a:ext>
-            </a:extLst>
-          </p:cNvPr>
-          <p:cNvPicPr>
-            <a:picLocks noChangeAspect="1" noChangeArrowheads="1"/>
-          </p:cNvPicPr>
-          <p:nvPr/>
-        </p:nvPicPr>
-        <p:blipFill>
-          <a:blip r:embed="rId2">
-            <a:extLst>
-              <a:ext uri="{28A0092B-C50C-407E-A947-70E740481C1C}">
-                <a14:useLocalDpi xmlns:a14="http://schemas.microsoft.com/office/drawing/2010/main" val="0"/>
-              </a:ext>
-            </a:extLst>
-          </a:blip>
-          <a:srcRect/>
-          <a:stretch>
-            <a:fillRect/>
-          </a:stretch>
-        </p:blipFill>
-        <p:spPr bwMode="auto">
-          <a:xfrm>
-            <a:off x="3238499" y="95880"/>
-            <a:ext cx="5715000" cy="2219325"/>
-          </a:xfrm>
-          <a:prstGeom prst="rect">
-            <a:avLst/>
-          </a:prstGeom>
-          <a:noFill/>
-          <a:extLst>
-            <a:ext uri="{909E8E84-426E-40DD-AFC4-6F175D3DCCD1}">
-              <a14:hiddenFill xmlns:a14="http://schemas.microsoft.com/office/drawing/2010/main">
-                <a:solidFill>
-                  <a:srgbClr val="FFFFFF"/>
-                </a:solidFill>
-              </a14:hiddenFill>
-            </a:ext>
-          </a:extLst>
-        </p:spPr>
-      </p:pic>
       <p:sp>
         <p:nvSpPr>
           <p:cNvPr id="2" name="name">
@@ -4498,6 +4380,7 @@
           </a:bodyPr>
           <a:lstStyle/>
           <a:p>
+            <a:pPr algn="ctr"/>
             <a:r>
               <a:rPr lang="ko-KR" altLang="en-US" sz="16800" b="1" spc="5000" dirty="0">
                 <a:solidFill>
@@ -4567,10 +4450,34 @@
           </a:p>
         </p:txBody>
       </p:sp>
+      <p:pic>
+        <p:nvPicPr>
+          <p:cNvPr id="9" name="Picture 8" descr="image.jpeg"/>
+          <p:cNvPicPr>
+            <a:picLocks noChangeAspect="1"/>
+          </p:cNvPicPr>
+          <p:nvPr/>
+        </p:nvPicPr>
+        <p:blipFill>
+          <a:blip r:embed="rId2"/>
+          <a:stretch>
+            <a:fillRect/>
+          </a:stretch>
+        </p:blipFill>
+        <p:spPr>
+          <a:xfrm>
+            <a:off x="3238499" y="95880"/>
+            <a:ext cx="5715000" cy="2219325"/>
+          </a:xfrm>
+          <a:prstGeom prst="rect">
+            <a:avLst/>
+          </a:prstGeom>
+        </p:spPr>
+      </p:pic>
     </p:spTree>
     <p:extLst>
       <p:ext uri="{BB962C8B-B14F-4D97-AF65-F5344CB8AC3E}">
-        <p14:creationId xmlns:p14="http://schemas.microsoft.com/office/powerpoint/2010/main" val="1073636120"/>
+        <p14:creationId xmlns:p14="http://schemas.microsoft.com/office/powerpoint/2010/main" val="3275257662"/>
       </p:ext>
     </p:extLst>
   </p:cSld>
@@ -4649,53 +4556,6 @@
           </a:p>
         </p:txBody>
       </p:sp>
-      <p:pic>
-        <p:nvPicPr>
-          <p:cNvPr id="3" name="logo" descr="2조원 파급 효과 내고도 매 맞은 &amp;#39;인천관광공사&amp;#39; - 위키리크스한국">
-            <a:extLst>
-              <a:ext uri="{FF2B5EF4-FFF2-40B4-BE49-F238E27FC236}">
-                <a16:creationId xmlns:a16="http://schemas.microsoft.com/office/drawing/2014/main" id="{E2D33970-FE8B-4A0A-AD13-6F0D6F5FB73A}"/>
-              </a:ext>
-            </a:extLst>
-          </p:cNvPr>
-          <p:cNvPicPr>
-            <a:picLocks noChangeAspect="1" noChangeArrowheads="1"/>
-          </p:cNvPicPr>
-          <p:nvPr/>
-        </p:nvPicPr>
-        <p:blipFill>
-          <a:blip r:embed="rId2">
-            <a:extLst>
-              <a:ext uri="{28A0092B-C50C-407E-A947-70E740481C1C}">
-                <a14:useLocalDpi xmlns:a14="http://schemas.microsoft.com/office/drawing/2010/main" val="0"/>
-              </a:ext>
-            </a:extLst>
-          </a:blip>
-          <a:srcRect/>
-          <a:stretch>
-            <a:fillRect/>
-          </a:stretch>
-        </p:blipFill>
-        <p:spPr bwMode="auto">
-          <a:xfrm>
-            <a:off x="3238499" y="95880"/>
-            <a:ext cx="5715000" cy="2219325"/>
-          </a:xfrm>
-          <a:prstGeom prst="rect">
-            <a:avLst/>
-          </a:prstGeom>
-          <a:noFill/>
-          <a:extLst>
-            <a:ext uri="{909E8E84-426E-40DD-AFC4-6F175D3DCCD1}">
-              <a14:hiddenFill xmlns:a14="http://schemas.microsoft.com/office/drawing/2010/main">
-                <a:solidFill>
-                  <a:srgbClr val="FFFFFF"/>
-                </a:solidFill>
-              </a14:hiddenFill>
-            </a:ext>
-          </a:extLst>
-        </p:spPr>
-      </p:pic>
       <p:sp>
         <p:nvSpPr>
           <p:cNvPr id="2" name="name">
@@ -4724,6 +4584,7 @@
           </a:bodyPr>
           <a:lstStyle/>
           <a:p>
+            <a:pPr algn="ctr"/>
             <a:r>
               <a:rPr lang="ko-KR" altLang="en-US" sz="16800" b="1" spc="5000" dirty="0">
                 <a:solidFill>
@@ -4793,10 +4654,34 @@
           </a:p>
         </p:txBody>
       </p:sp>
+      <p:pic>
+        <p:nvPicPr>
+          <p:cNvPr id="9" name="Picture 8" descr="image.jpeg"/>
+          <p:cNvPicPr>
+            <a:picLocks noChangeAspect="1"/>
+          </p:cNvPicPr>
+          <p:nvPr/>
+        </p:nvPicPr>
+        <p:blipFill>
+          <a:blip r:embed="rId2"/>
+          <a:stretch>
+            <a:fillRect/>
+          </a:stretch>
+        </p:blipFill>
+        <p:spPr>
+          <a:xfrm>
+            <a:off x="3238499" y="95880"/>
+            <a:ext cx="5715000" cy="2219325"/>
+          </a:xfrm>
+          <a:prstGeom prst="rect">
+            <a:avLst/>
+          </a:prstGeom>
+        </p:spPr>
+      </p:pic>
     </p:spTree>
     <p:extLst>
       <p:ext uri="{BB962C8B-B14F-4D97-AF65-F5344CB8AC3E}">
-        <p14:creationId xmlns:p14="http://schemas.microsoft.com/office/powerpoint/2010/main" val="3300928280"/>
+        <p14:creationId xmlns:p14="http://schemas.microsoft.com/office/powerpoint/2010/main" val="3011487988"/>
       </p:ext>
     </p:extLst>
   </p:cSld>
@@ -4875,53 +4760,6 @@
           </a:p>
         </p:txBody>
       </p:sp>
-      <p:pic>
-        <p:nvPicPr>
-          <p:cNvPr id="3" name="logo" descr="2조원 파급 효과 내고도 매 맞은 &amp;#39;인천관광공사&amp;#39; - 위키리크스한국">
-            <a:extLst>
-              <a:ext uri="{FF2B5EF4-FFF2-40B4-BE49-F238E27FC236}">
-                <a16:creationId xmlns:a16="http://schemas.microsoft.com/office/drawing/2014/main" id="{E2D33970-FE8B-4A0A-AD13-6F0D6F5FB73A}"/>
-              </a:ext>
-            </a:extLst>
-          </p:cNvPr>
-          <p:cNvPicPr>
-            <a:picLocks noChangeAspect="1" noChangeArrowheads="1"/>
-          </p:cNvPicPr>
-          <p:nvPr/>
-        </p:nvPicPr>
-        <p:blipFill>
-          <a:blip r:embed="rId2">
-            <a:extLst>
-              <a:ext uri="{28A0092B-C50C-407E-A947-70E740481C1C}">
-                <a14:useLocalDpi xmlns:a14="http://schemas.microsoft.com/office/drawing/2010/main" val="0"/>
-              </a:ext>
-            </a:extLst>
-          </a:blip>
-          <a:srcRect/>
-          <a:stretch>
-            <a:fillRect/>
-          </a:stretch>
-        </p:blipFill>
-        <p:spPr bwMode="auto">
-          <a:xfrm>
-            <a:off x="3238499" y="95880"/>
-            <a:ext cx="5715000" cy="2219325"/>
-          </a:xfrm>
-          <a:prstGeom prst="rect">
-            <a:avLst/>
-          </a:prstGeom>
-          <a:noFill/>
-          <a:extLst>
-            <a:ext uri="{909E8E84-426E-40DD-AFC4-6F175D3DCCD1}">
-              <a14:hiddenFill xmlns:a14="http://schemas.microsoft.com/office/drawing/2010/main">
-                <a:solidFill>
-                  <a:srgbClr val="FFFFFF"/>
-                </a:solidFill>
-              </a14:hiddenFill>
-            </a:ext>
-          </a:extLst>
-        </p:spPr>
-      </p:pic>
       <p:sp>
         <p:nvSpPr>
           <p:cNvPr id="2" name="name">
@@ -4950,6 +4788,7 @@
           </a:bodyPr>
           <a:lstStyle/>
           <a:p>
+            <a:pPr algn="ctr"/>
             <a:r>
               <a:rPr lang="ko-KR" altLang="en-US" sz="16800" b="1" spc="5000" dirty="0">
                 <a:solidFill>
@@ -5019,10 +4858,34 @@
           </a:p>
         </p:txBody>
       </p:sp>
+      <p:pic>
+        <p:nvPicPr>
+          <p:cNvPr id="9" name="Picture 8" descr="image.jpeg"/>
+          <p:cNvPicPr>
+            <a:picLocks noChangeAspect="1"/>
+          </p:cNvPicPr>
+          <p:nvPr/>
+        </p:nvPicPr>
+        <p:blipFill>
+          <a:blip r:embed="rId2"/>
+          <a:stretch>
+            <a:fillRect/>
+          </a:stretch>
+        </p:blipFill>
+        <p:spPr>
+          <a:xfrm>
+            <a:off x="3238499" y="95880"/>
+            <a:ext cx="5715000" cy="2219325"/>
+          </a:xfrm>
+          <a:prstGeom prst="rect">
+            <a:avLst/>
+          </a:prstGeom>
+        </p:spPr>
+      </p:pic>
     </p:spTree>
     <p:extLst>
       <p:ext uri="{BB962C8B-B14F-4D97-AF65-F5344CB8AC3E}">
-        <p14:creationId xmlns:p14="http://schemas.microsoft.com/office/powerpoint/2010/main" val="2249312991"/>
+        <p14:creationId xmlns:p14="http://schemas.microsoft.com/office/powerpoint/2010/main" val="614396915"/>
       </p:ext>
     </p:extLst>
   </p:cSld>
@@ -5101,53 +4964,6 @@
           </a:p>
         </p:txBody>
       </p:sp>
-      <p:pic>
-        <p:nvPicPr>
-          <p:cNvPr id="3" name="logo" descr="2조원 파급 효과 내고도 매 맞은 &amp;#39;인천관광공사&amp;#39; - 위키리크스한국">
-            <a:extLst>
-              <a:ext uri="{FF2B5EF4-FFF2-40B4-BE49-F238E27FC236}">
-                <a16:creationId xmlns:a16="http://schemas.microsoft.com/office/drawing/2014/main" id="{E2D33970-FE8B-4A0A-AD13-6F0D6F5FB73A}"/>
-              </a:ext>
-            </a:extLst>
-          </p:cNvPr>
-          <p:cNvPicPr>
-            <a:picLocks noChangeAspect="1" noChangeArrowheads="1"/>
-          </p:cNvPicPr>
-          <p:nvPr/>
-        </p:nvPicPr>
-        <p:blipFill>
-          <a:blip r:embed="rId2">
-            <a:extLst>
-              <a:ext uri="{28A0092B-C50C-407E-A947-70E740481C1C}">
-                <a14:useLocalDpi xmlns:a14="http://schemas.microsoft.com/office/drawing/2010/main" val="0"/>
-              </a:ext>
-            </a:extLst>
-          </a:blip>
-          <a:srcRect/>
-          <a:stretch>
-            <a:fillRect/>
-          </a:stretch>
-        </p:blipFill>
-        <p:spPr bwMode="auto">
-          <a:xfrm>
-            <a:off x="3238499" y="95880"/>
-            <a:ext cx="5715000" cy="2219325"/>
-          </a:xfrm>
-          <a:prstGeom prst="rect">
-            <a:avLst/>
-          </a:prstGeom>
-          <a:noFill/>
-          <a:extLst>
-            <a:ext uri="{909E8E84-426E-40DD-AFC4-6F175D3DCCD1}">
-              <a14:hiddenFill xmlns:a14="http://schemas.microsoft.com/office/drawing/2010/main">
-                <a:solidFill>
-                  <a:srgbClr val="FFFFFF"/>
-                </a:solidFill>
-              </a14:hiddenFill>
-            </a:ext>
-          </a:extLst>
-        </p:spPr>
-      </p:pic>
       <p:sp>
         <p:nvSpPr>
           <p:cNvPr id="2" name="name">
@@ -5176,6 +4992,7 @@
           </a:bodyPr>
           <a:lstStyle/>
           <a:p>
+            <a:pPr algn="ctr"/>
             <a:r>
               <a:rPr lang="ko-KR" altLang="en-US" sz="16800" b="1" spc="5000" dirty="0">
                 <a:solidFill>
@@ -5245,10 +5062,34 @@
           </a:p>
         </p:txBody>
       </p:sp>
+      <p:pic>
+        <p:nvPicPr>
+          <p:cNvPr id="9" name="Picture 8" descr="image.jpeg"/>
+          <p:cNvPicPr>
+            <a:picLocks noChangeAspect="1"/>
+          </p:cNvPicPr>
+          <p:nvPr/>
+        </p:nvPicPr>
+        <p:blipFill>
+          <a:blip r:embed="rId2"/>
+          <a:stretch>
+            <a:fillRect/>
+          </a:stretch>
+        </p:blipFill>
+        <p:spPr>
+          <a:xfrm>
+            <a:off x="3238499" y="95880"/>
+            <a:ext cx="5715000" cy="2219325"/>
+          </a:xfrm>
+          <a:prstGeom prst="rect">
+            <a:avLst/>
+          </a:prstGeom>
+        </p:spPr>
+      </p:pic>
     </p:spTree>
     <p:extLst>
       <p:ext uri="{BB962C8B-B14F-4D97-AF65-F5344CB8AC3E}">
-        <p14:creationId xmlns:p14="http://schemas.microsoft.com/office/powerpoint/2010/main" val="2215460005"/>
+        <p14:creationId xmlns:p14="http://schemas.microsoft.com/office/powerpoint/2010/main" val="2929505812"/>
       </p:ext>
     </p:extLst>
   </p:cSld>
@@ -5327,53 +5168,6 @@
           </a:p>
         </p:txBody>
       </p:sp>
-      <p:pic>
-        <p:nvPicPr>
-          <p:cNvPr id="3" name="logo" descr="2조원 파급 효과 내고도 매 맞은 &amp;#39;인천관광공사&amp;#39; - 위키리크스한국">
-            <a:extLst>
-              <a:ext uri="{FF2B5EF4-FFF2-40B4-BE49-F238E27FC236}">
-                <a16:creationId xmlns:a16="http://schemas.microsoft.com/office/drawing/2014/main" id="{E2D33970-FE8B-4A0A-AD13-6F0D6F5FB73A}"/>
-              </a:ext>
-            </a:extLst>
-          </p:cNvPr>
-          <p:cNvPicPr>
-            <a:picLocks noChangeAspect="1" noChangeArrowheads="1"/>
-          </p:cNvPicPr>
-          <p:nvPr/>
-        </p:nvPicPr>
-        <p:blipFill>
-          <a:blip r:embed="rId2">
-            <a:extLst>
-              <a:ext uri="{28A0092B-C50C-407E-A947-70E740481C1C}">
-                <a14:useLocalDpi xmlns:a14="http://schemas.microsoft.com/office/drawing/2010/main" val="0"/>
-              </a:ext>
-            </a:extLst>
-          </a:blip>
-          <a:srcRect/>
-          <a:stretch>
-            <a:fillRect/>
-          </a:stretch>
-        </p:blipFill>
-        <p:spPr bwMode="auto">
-          <a:xfrm>
-            <a:off x="3238499" y="95880"/>
-            <a:ext cx="5715000" cy="2219325"/>
-          </a:xfrm>
-          <a:prstGeom prst="rect">
-            <a:avLst/>
-          </a:prstGeom>
-          <a:noFill/>
-          <a:extLst>
-            <a:ext uri="{909E8E84-426E-40DD-AFC4-6F175D3DCCD1}">
-              <a14:hiddenFill xmlns:a14="http://schemas.microsoft.com/office/drawing/2010/main">
-                <a:solidFill>
-                  <a:srgbClr val="FFFFFF"/>
-                </a:solidFill>
-              </a14:hiddenFill>
-            </a:ext>
-          </a:extLst>
-        </p:spPr>
-      </p:pic>
       <p:sp>
         <p:nvSpPr>
           <p:cNvPr id="2" name="name">
@@ -5402,6 +5196,7 @@
           </a:bodyPr>
           <a:lstStyle/>
           <a:p>
+            <a:pPr algn="ctr"/>
             <a:r>
               <a:rPr lang="ko-KR" altLang="en-US" sz="16800" b="1" spc="5000" dirty="0">
                 <a:solidFill>
@@ -5471,10 +5266,34 @@
           </a:p>
         </p:txBody>
       </p:sp>
+      <p:pic>
+        <p:nvPicPr>
+          <p:cNvPr id="9" name="Picture 8" descr="image.jpeg"/>
+          <p:cNvPicPr>
+            <a:picLocks noChangeAspect="1"/>
+          </p:cNvPicPr>
+          <p:nvPr/>
+        </p:nvPicPr>
+        <p:blipFill>
+          <a:blip r:embed="rId2"/>
+          <a:stretch>
+            <a:fillRect/>
+          </a:stretch>
+        </p:blipFill>
+        <p:spPr>
+          <a:xfrm>
+            <a:off x="3238499" y="95880"/>
+            <a:ext cx="5715000" cy="2219325"/>
+          </a:xfrm>
+          <a:prstGeom prst="rect">
+            <a:avLst/>
+          </a:prstGeom>
+        </p:spPr>
+      </p:pic>
     </p:spTree>
     <p:extLst>
       <p:ext uri="{BB962C8B-B14F-4D97-AF65-F5344CB8AC3E}">
-        <p14:creationId xmlns:p14="http://schemas.microsoft.com/office/powerpoint/2010/main" val="493464421"/>
+        <p14:creationId xmlns:p14="http://schemas.microsoft.com/office/powerpoint/2010/main" val="1040072828"/>
       </p:ext>
     </p:extLst>
   </p:cSld>
@@ -5553,53 +5372,6 @@
           </a:p>
         </p:txBody>
       </p:sp>
-      <p:pic>
-        <p:nvPicPr>
-          <p:cNvPr id="3" name="logo" descr="2조원 파급 효과 내고도 매 맞은 &amp;#39;인천관광공사&amp;#39; - 위키리크스한국">
-            <a:extLst>
-              <a:ext uri="{FF2B5EF4-FFF2-40B4-BE49-F238E27FC236}">
-                <a16:creationId xmlns:a16="http://schemas.microsoft.com/office/drawing/2014/main" id="{E2D33970-FE8B-4A0A-AD13-6F0D6F5FB73A}"/>
-              </a:ext>
-            </a:extLst>
-          </p:cNvPr>
-          <p:cNvPicPr>
-            <a:picLocks noChangeAspect="1" noChangeArrowheads="1"/>
-          </p:cNvPicPr>
-          <p:nvPr/>
-        </p:nvPicPr>
-        <p:blipFill>
-          <a:blip r:embed="rId2">
-            <a:extLst>
-              <a:ext uri="{28A0092B-C50C-407E-A947-70E740481C1C}">
-                <a14:useLocalDpi xmlns:a14="http://schemas.microsoft.com/office/drawing/2010/main" val="0"/>
-              </a:ext>
-            </a:extLst>
-          </a:blip>
-          <a:srcRect/>
-          <a:stretch>
-            <a:fillRect/>
-          </a:stretch>
-        </p:blipFill>
-        <p:spPr bwMode="auto">
-          <a:xfrm>
-            <a:off x="3238499" y="95880"/>
-            <a:ext cx="5715000" cy="2219325"/>
-          </a:xfrm>
-          <a:prstGeom prst="rect">
-            <a:avLst/>
-          </a:prstGeom>
-          <a:noFill/>
-          <a:extLst>
-            <a:ext uri="{909E8E84-426E-40DD-AFC4-6F175D3DCCD1}">
-              <a14:hiddenFill xmlns:a14="http://schemas.microsoft.com/office/drawing/2010/main">
-                <a:solidFill>
-                  <a:srgbClr val="FFFFFF"/>
-                </a:solidFill>
-              </a14:hiddenFill>
-            </a:ext>
-          </a:extLst>
-        </p:spPr>
-      </p:pic>
       <p:sp>
         <p:nvSpPr>
           <p:cNvPr id="2" name="name">
@@ -5628,6 +5400,7 @@
           </a:bodyPr>
           <a:lstStyle/>
           <a:p>
+            <a:pPr algn="ctr"/>
             <a:r>
               <a:rPr lang="ko-KR" altLang="en-US" sz="16800" b="1" spc="5000" dirty="0">
                 <a:solidFill>
@@ -5697,10 +5470,34 @@
           </a:p>
         </p:txBody>
       </p:sp>
+      <p:pic>
+        <p:nvPicPr>
+          <p:cNvPr id="9" name="Picture 8" descr="image.jpeg"/>
+          <p:cNvPicPr>
+            <a:picLocks noChangeAspect="1"/>
+          </p:cNvPicPr>
+          <p:nvPr/>
+        </p:nvPicPr>
+        <p:blipFill>
+          <a:blip r:embed="rId2"/>
+          <a:stretch>
+            <a:fillRect/>
+          </a:stretch>
+        </p:blipFill>
+        <p:spPr>
+          <a:xfrm>
+            <a:off x="3238499" y="95880"/>
+            <a:ext cx="5715000" cy="2219325"/>
+          </a:xfrm>
+          <a:prstGeom prst="rect">
+            <a:avLst/>
+          </a:prstGeom>
+        </p:spPr>
+      </p:pic>
     </p:spTree>
     <p:extLst>
       <p:ext uri="{BB962C8B-B14F-4D97-AF65-F5344CB8AC3E}">
-        <p14:creationId xmlns:p14="http://schemas.microsoft.com/office/powerpoint/2010/main" val="4158011357"/>
+        <p14:creationId xmlns:p14="http://schemas.microsoft.com/office/powerpoint/2010/main" val="4047782208"/>
       </p:ext>
     </p:extLst>
   </p:cSld>
@@ -5779,53 +5576,6 @@
           </a:p>
         </p:txBody>
       </p:sp>
-      <p:pic>
-        <p:nvPicPr>
-          <p:cNvPr id="3" name="logo" descr="2조원 파급 효과 내고도 매 맞은 &amp;#39;인천관광공사&amp;#39; - 위키리크스한국">
-            <a:extLst>
-              <a:ext uri="{FF2B5EF4-FFF2-40B4-BE49-F238E27FC236}">
-                <a16:creationId xmlns:a16="http://schemas.microsoft.com/office/drawing/2014/main" id="{E2D33970-FE8B-4A0A-AD13-6F0D6F5FB73A}"/>
-              </a:ext>
-            </a:extLst>
-          </p:cNvPr>
-          <p:cNvPicPr>
-            <a:picLocks noChangeAspect="1" noChangeArrowheads="1"/>
-          </p:cNvPicPr>
-          <p:nvPr/>
-        </p:nvPicPr>
-        <p:blipFill>
-          <a:blip r:embed="rId2">
-            <a:extLst>
-              <a:ext uri="{28A0092B-C50C-407E-A947-70E740481C1C}">
-                <a14:useLocalDpi xmlns:a14="http://schemas.microsoft.com/office/drawing/2010/main" val="0"/>
-              </a:ext>
-            </a:extLst>
-          </a:blip>
-          <a:srcRect/>
-          <a:stretch>
-            <a:fillRect/>
-          </a:stretch>
-        </p:blipFill>
-        <p:spPr bwMode="auto">
-          <a:xfrm>
-            <a:off x="3238499" y="95880"/>
-            <a:ext cx="5715000" cy="2219325"/>
-          </a:xfrm>
-          <a:prstGeom prst="rect">
-            <a:avLst/>
-          </a:prstGeom>
-          <a:noFill/>
-          <a:extLst>
-            <a:ext uri="{909E8E84-426E-40DD-AFC4-6F175D3DCCD1}">
-              <a14:hiddenFill xmlns:a14="http://schemas.microsoft.com/office/drawing/2010/main">
-                <a:solidFill>
-                  <a:srgbClr val="FFFFFF"/>
-                </a:solidFill>
-              </a14:hiddenFill>
-            </a:ext>
-          </a:extLst>
-        </p:spPr>
-      </p:pic>
       <p:sp>
         <p:nvSpPr>
           <p:cNvPr id="2" name="name">
@@ -5854,6 +5604,7 @@
           </a:bodyPr>
           <a:lstStyle/>
           <a:p>
+            <a:pPr algn="ctr"/>
             <a:r>
               <a:rPr lang="ko-KR" altLang="en-US" sz="16800" b="1" spc="5000" dirty="0">
                 <a:solidFill>
@@ -5923,10 +5674,34 @@
           </a:p>
         </p:txBody>
       </p:sp>
+      <p:pic>
+        <p:nvPicPr>
+          <p:cNvPr id="9" name="Picture 8" descr="image.jpeg"/>
+          <p:cNvPicPr>
+            <a:picLocks noChangeAspect="1"/>
+          </p:cNvPicPr>
+          <p:nvPr/>
+        </p:nvPicPr>
+        <p:blipFill>
+          <a:blip r:embed="rId2"/>
+          <a:stretch>
+            <a:fillRect/>
+          </a:stretch>
+        </p:blipFill>
+        <p:spPr>
+          <a:xfrm>
+            <a:off x="3238499" y="95880"/>
+            <a:ext cx="5715000" cy="2219325"/>
+          </a:xfrm>
+          <a:prstGeom prst="rect">
+            <a:avLst/>
+          </a:prstGeom>
+        </p:spPr>
+      </p:pic>
     </p:spTree>
     <p:extLst>
       <p:ext uri="{BB962C8B-B14F-4D97-AF65-F5344CB8AC3E}">
-        <p14:creationId xmlns:p14="http://schemas.microsoft.com/office/powerpoint/2010/main" val="2580959340"/>
+        <p14:creationId xmlns:p14="http://schemas.microsoft.com/office/powerpoint/2010/main" val="2492986513"/>
       </p:ext>
     </p:extLst>
   </p:cSld>
@@ -6005,53 +5780,6 @@
           </a:p>
         </p:txBody>
       </p:sp>
-      <p:pic>
-        <p:nvPicPr>
-          <p:cNvPr id="3" name="logo" descr="2조원 파급 효과 내고도 매 맞은 &amp;#39;인천관광공사&amp;#39; - 위키리크스한국">
-            <a:extLst>
-              <a:ext uri="{FF2B5EF4-FFF2-40B4-BE49-F238E27FC236}">
-                <a16:creationId xmlns:a16="http://schemas.microsoft.com/office/drawing/2014/main" id="{E2D33970-FE8B-4A0A-AD13-6F0D6F5FB73A}"/>
-              </a:ext>
-            </a:extLst>
-          </p:cNvPr>
-          <p:cNvPicPr>
-            <a:picLocks noChangeAspect="1" noChangeArrowheads="1"/>
-          </p:cNvPicPr>
-          <p:nvPr/>
-        </p:nvPicPr>
-        <p:blipFill>
-          <a:blip r:embed="rId2">
-            <a:extLst>
-              <a:ext uri="{28A0092B-C50C-407E-A947-70E740481C1C}">
-                <a14:useLocalDpi xmlns:a14="http://schemas.microsoft.com/office/drawing/2010/main" val="0"/>
-              </a:ext>
-            </a:extLst>
-          </a:blip>
-          <a:srcRect/>
-          <a:stretch>
-            <a:fillRect/>
-          </a:stretch>
-        </p:blipFill>
-        <p:spPr bwMode="auto">
-          <a:xfrm>
-            <a:off x="3238499" y="95880"/>
-            <a:ext cx="5715000" cy="2219325"/>
-          </a:xfrm>
-          <a:prstGeom prst="rect">
-            <a:avLst/>
-          </a:prstGeom>
-          <a:noFill/>
-          <a:extLst>
-            <a:ext uri="{909E8E84-426E-40DD-AFC4-6F175D3DCCD1}">
-              <a14:hiddenFill xmlns:a14="http://schemas.microsoft.com/office/drawing/2010/main">
-                <a:solidFill>
-                  <a:srgbClr val="FFFFFF"/>
-                </a:solidFill>
-              </a14:hiddenFill>
-            </a:ext>
-          </a:extLst>
-        </p:spPr>
-      </p:pic>
       <p:sp>
         <p:nvSpPr>
           <p:cNvPr id="2" name="name">
@@ -6080,6 +5808,7 @@
           </a:bodyPr>
           <a:lstStyle/>
           <a:p>
+            <a:pPr algn="ctr"/>
             <a:r>
               <a:rPr lang="ko-KR" altLang="en-US" sz="16800" b="1" spc="5000" dirty="0">
                 <a:solidFill>
@@ -6149,10 +5878,34 @@
           </a:p>
         </p:txBody>
       </p:sp>
+      <p:pic>
+        <p:nvPicPr>
+          <p:cNvPr id="9" name="Picture 8" descr="image.jpeg"/>
+          <p:cNvPicPr>
+            <a:picLocks noChangeAspect="1"/>
+          </p:cNvPicPr>
+          <p:nvPr/>
+        </p:nvPicPr>
+        <p:blipFill>
+          <a:blip r:embed="rId2"/>
+          <a:stretch>
+            <a:fillRect/>
+          </a:stretch>
+        </p:blipFill>
+        <p:spPr>
+          <a:xfrm>
+            <a:off x="3238499" y="95880"/>
+            <a:ext cx="5715000" cy="2219325"/>
+          </a:xfrm>
+          <a:prstGeom prst="rect">
+            <a:avLst/>
+          </a:prstGeom>
+        </p:spPr>
+      </p:pic>
     </p:spTree>
     <p:extLst>
       <p:ext uri="{BB962C8B-B14F-4D97-AF65-F5344CB8AC3E}">
-        <p14:creationId xmlns:p14="http://schemas.microsoft.com/office/powerpoint/2010/main" val="2278874990"/>
+        <p14:creationId xmlns:p14="http://schemas.microsoft.com/office/powerpoint/2010/main" val="1162837149"/>
       </p:ext>
     </p:extLst>
   </p:cSld>
@@ -6231,53 +5984,6 @@
           </a:p>
         </p:txBody>
       </p:sp>
-      <p:pic>
-        <p:nvPicPr>
-          <p:cNvPr id="3" name="logo" descr="2조원 파급 효과 내고도 매 맞은 &amp;#39;인천관광공사&amp;#39; - 위키리크스한국">
-            <a:extLst>
-              <a:ext uri="{FF2B5EF4-FFF2-40B4-BE49-F238E27FC236}">
-                <a16:creationId xmlns:a16="http://schemas.microsoft.com/office/drawing/2014/main" id="{E2D33970-FE8B-4A0A-AD13-6F0D6F5FB73A}"/>
-              </a:ext>
-            </a:extLst>
-          </p:cNvPr>
-          <p:cNvPicPr>
-            <a:picLocks noChangeAspect="1" noChangeArrowheads="1"/>
-          </p:cNvPicPr>
-          <p:nvPr/>
-        </p:nvPicPr>
-        <p:blipFill>
-          <a:blip r:embed="rId2">
-            <a:extLst>
-              <a:ext uri="{28A0092B-C50C-407E-A947-70E740481C1C}">
-                <a14:useLocalDpi xmlns:a14="http://schemas.microsoft.com/office/drawing/2010/main" val="0"/>
-              </a:ext>
-            </a:extLst>
-          </a:blip>
-          <a:srcRect/>
-          <a:stretch>
-            <a:fillRect/>
-          </a:stretch>
-        </p:blipFill>
-        <p:spPr bwMode="auto">
-          <a:xfrm>
-            <a:off x="3238499" y="95880"/>
-            <a:ext cx="5715000" cy="2219325"/>
-          </a:xfrm>
-          <a:prstGeom prst="rect">
-            <a:avLst/>
-          </a:prstGeom>
-          <a:noFill/>
-          <a:extLst>
-            <a:ext uri="{909E8E84-426E-40DD-AFC4-6F175D3DCCD1}">
-              <a14:hiddenFill xmlns:a14="http://schemas.microsoft.com/office/drawing/2010/main">
-                <a:solidFill>
-                  <a:srgbClr val="FFFFFF"/>
-                </a:solidFill>
-              </a14:hiddenFill>
-            </a:ext>
-          </a:extLst>
-        </p:spPr>
-      </p:pic>
       <p:sp>
         <p:nvSpPr>
           <p:cNvPr id="2" name="name">
@@ -6306,6 +6012,7 @@
           </a:bodyPr>
           <a:lstStyle/>
           <a:p>
+            <a:pPr algn="ctr"/>
             <a:r>
               <a:rPr lang="ko-KR" altLang="en-US" sz="16800" b="1" spc="5000" dirty="0">
                 <a:solidFill>
@@ -6375,10 +6082,34 @@
           </a:p>
         </p:txBody>
       </p:sp>
+      <p:pic>
+        <p:nvPicPr>
+          <p:cNvPr id="9" name="Picture 8" descr="image.jpeg"/>
+          <p:cNvPicPr>
+            <a:picLocks noChangeAspect="1"/>
+          </p:cNvPicPr>
+          <p:nvPr/>
+        </p:nvPicPr>
+        <p:blipFill>
+          <a:blip r:embed="rId2"/>
+          <a:stretch>
+            <a:fillRect/>
+          </a:stretch>
+        </p:blipFill>
+        <p:spPr>
+          <a:xfrm>
+            <a:off x="3238499" y="95880"/>
+            <a:ext cx="5715000" cy="2219325"/>
+          </a:xfrm>
+          <a:prstGeom prst="rect">
+            <a:avLst/>
+          </a:prstGeom>
+        </p:spPr>
+      </p:pic>
     </p:spTree>
     <p:extLst>
       <p:ext uri="{BB962C8B-B14F-4D97-AF65-F5344CB8AC3E}">
-        <p14:creationId xmlns:p14="http://schemas.microsoft.com/office/powerpoint/2010/main" val="1875801021"/>
+        <p14:creationId xmlns:p14="http://schemas.microsoft.com/office/powerpoint/2010/main" val="1815710346"/>
       </p:ext>
     </p:extLst>
   </p:cSld>
@@ -6457,53 +6188,6 @@
           </a:p>
         </p:txBody>
       </p:sp>
-      <p:pic>
-        <p:nvPicPr>
-          <p:cNvPr id="3" name="logo" descr="2조원 파급 효과 내고도 매 맞은 &amp;#39;인천관광공사&amp;#39; - 위키리크스한국">
-            <a:extLst>
-              <a:ext uri="{FF2B5EF4-FFF2-40B4-BE49-F238E27FC236}">
-                <a16:creationId xmlns:a16="http://schemas.microsoft.com/office/drawing/2014/main" id="{E2D33970-FE8B-4A0A-AD13-6F0D6F5FB73A}"/>
-              </a:ext>
-            </a:extLst>
-          </p:cNvPr>
-          <p:cNvPicPr>
-            <a:picLocks noChangeAspect="1" noChangeArrowheads="1"/>
-          </p:cNvPicPr>
-          <p:nvPr/>
-        </p:nvPicPr>
-        <p:blipFill>
-          <a:blip r:embed="rId2">
-            <a:extLst>
-              <a:ext uri="{28A0092B-C50C-407E-A947-70E740481C1C}">
-                <a14:useLocalDpi xmlns:a14="http://schemas.microsoft.com/office/drawing/2010/main" val="0"/>
-              </a:ext>
-            </a:extLst>
-          </a:blip>
-          <a:srcRect/>
-          <a:stretch>
-            <a:fillRect/>
-          </a:stretch>
-        </p:blipFill>
-        <p:spPr bwMode="auto">
-          <a:xfrm>
-            <a:off x="3238499" y="95880"/>
-            <a:ext cx="5715000" cy="2219325"/>
-          </a:xfrm>
-          <a:prstGeom prst="rect">
-            <a:avLst/>
-          </a:prstGeom>
-          <a:noFill/>
-          <a:extLst>
-            <a:ext uri="{909E8E84-426E-40DD-AFC4-6F175D3DCCD1}">
-              <a14:hiddenFill xmlns:a14="http://schemas.microsoft.com/office/drawing/2010/main">
-                <a:solidFill>
-                  <a:srgbClr val="FFFFFF"/>
-                </a:solidFill>
-              </a14:hiddenFill>
-            </a:ext>
-          </a:extLst>
-        </p:spPr>
-      </p:pic>
       <p:sp>
         <p:nvSpPr>
           <p:cNvPr id="2" name="name">
@@ -6532,6 +6216,7 @@
           </a:bodyPr>
           <a:lstStyle/>
           <a:p>
+            <a:pPr algn="ctr"/>
             <a:r>
               <a:rPr lang="ko-KR" altLang="en-US" sz="16800" b="1" spc="5000" dirty="0">
                 <a:solidFill>
@@ -6601,10 +6286,34 @@
           </a:p>
         </p:txBody>
       </p:sp>
+      <p:pic>
+        <p:nvPicPr>
+          <p:cNvPr id="9" name="Picture 8" descr="image.jpeg"/>
+          <p:cNvPicPr>
+            <a:picLocks noChangeAspect="1"/>
+          </p:cNvPicPr>
+          <p:nvPr/>
+        </p:nvPicPr>
+        <p:blipFill>
+          <a:blip r:embed="rId2"/>
+          <a:stretch>
+            <a:fillRect/>
+          </a:stretch>
+        </p:blipFill>
+        <p:spPr>
+          <a:xfrm>
+            <a:off x="3238499" y="95880"/>
+            <a:ext cx="5715000" cy="2219325"/>
+          </a:xfrm>
+          <a:prstGeom prst="rect">
+            <a:avLst/>
+          </a:prstGeom>
+        </p:spPr>
+      </p:pic>
     </p:spTree>
     <p:extLst>
       <p:ext uri="{BB962C8B-B14F-4D97-AF65-F5344CB8AC3E}">
-        <p14:creationId xmlns:p14="http://schemas.microsoft.com/office/powerpoint/2010/main" val="1478025612"/>
+        <p14:creationId xmlns:p14="http://schemas.microsoft.com/office/powerpoint/2010/main" val="2150988003"/>
       </p:ext>
     </p:extLst>
   </p:cSld>
@@ -6683,53 +6392,6 @@
           </a:p>
         </p:txBody>
       </p:sp>
-      <p:pic>
-        <p:nvPicPr>
-          <p:cNvPr id="3" name="logo" descr="2조원 파급 효과 내고도 매 맞은 &amp;#39;인천관광공사&amp;#39; - 위키리크스한국">
-            <a:extLst>
-              <a:ext uri="{FF2B5EF4-FFF2-40B4-BE49-F238E27FC236}">
-                <a16:creationId xmlns:a16="http://schemas.microsoft.com/office/drawing/2014/main" id="{E2D33970-FE8B-4A0A-AD13-6F0D6F5FB73A}"/>
-              </a:ext>
-            </a:extLst>
-          </p:cNvPr>
-          <p:cNvPicPr>
-            <a:picLocks noChangeAspect="1" noChangeArrowheads="1"/>
-          </p:cNvPicPr>
-          <p:nvPr/>
-        </p:nvPicPr>
-        <p:blipFill>
-          <a:blip r:embed="rId2">
-            <a:extLst>
-              <a:ext uri="{28A0092B-C50C-407E-A947-70E740481C1C}">
-                <a14:useLocalDpi xmlns:a14="http://schemas.microsoft.com/office/drawing/2010/main" val="0"/>
-              </a:ext>
-            </a:extLst>
-          </a:blip>
-          <a:srcRect/>
-          <a:stretch>
-            <a:fillRect/>
-          </a:stretch>
-        </p:blipFill>
-        <p:spPr bwMode="auto">
-          <a:xfrm>
-            <a:off x="3238499" y="95880"/>
-            <a:ext cx="5715000" cy="2219325"/>
-          </a:xfrm>
-          <a:prstGeom prst="rect">
-            <a:avLst/>
-          </a:prstGeom>
-          <a:noFill/>
-          <a:extLst>
-            <a:ext uri="{909E8E84-426E-40DD-AFC4-6F175D3DCCD1}">
-              <a14:hiddenFill xmlns:a14="http://schemas.microsoft.com/office/drawing/2010/main">
-                <a:solidFill>
-                  <a:srgbClr val="FFFFFF"/>
-                </a:solidFill>
-              </a14:hiddenFill>
-            </a:ext>
-          </a:extLst>
-        </p:spPr>
-      </p:pic>
       <p:sp>
         <p:nvSpPr>
           <p:cNvPr id="2" name="name">
@@ -6758,6 +6420,7 @@
           </a:bodyPr>
           <a:lstStyle/>
           <a:p>
+            <a:pPr algn="ctr"/>
             <a:r>
               <a:rPr lang="ko-KR" altLang="en-US" sz="16800" b="1" spc="5000" dirty="0">
                 <a:solidFill>
@@ -6827,10 +6490,34 @@
           </a:p>
         </p:txBody>
       </p:sp>
+      <p:pic>
+        <p:nvPicPr>
+          <p:cNvPr id="9" name="Picture 8" descr="image.jpeg"/>
+          <p:cNvPicPr>
+            <a:picLocks noChangeAspect="1"/>
+          </p:cNvPicPr>
+          <p:nvPr/>
+        </p:nvPicPr>
+        <p:blipFill>
+          <a:blip r:embed="rId2"/>
+          <a:stretch>
+            <a:fillRect/>
+          </a:stretch>
+        </p:blipFill>
+        <p:spPr>
+          <a:xfrm>
+            <a:off x="3238499" y="95880"/>
+            <a:ext cx="5715000" cy="2219325"/>
+          </a:xfrm>
+          <a:prstGeom prst="rect">
+            <a:avLst/>
+          </a:prstGeom>
+        </p:spPr>
+      </p:pic>
     </p:spTree>
     <p:extLst>
       <p:ext uri="{BB962C8B-B14F-4D97-AF65-F5344CB8AC3E}">
-        <p14:creationId xmlns:p14="http://schemas.microsoft.com/office/powerpoint/2010/main" val="1525684669"/>
+        <p14:creationId xmlns:p14="http://schemas.microsoft.com/office/powerpoint/2010/main" val="3928323673"/>
       </p:ext>
     </p:extLst>
   </p:cSld>
@@ -6909,53 +6596,6 @@
           </a:p>
         </p:txBody>
       </p:sp>
-      <p:pic>
-        <p:nvPicPr>
-          <p:cNvPr id="3" name="logo" descr="2조원 파급 효과 내고도 매 맞은 &amp;#39;인천관광공사&amp;#39; - 위키리크스한국">
-            <a:extLst>
-              <a:ext uri="{FF2B5EF4-FFF2-40B4-BE49-F238E27FC236}">
-                <a16:creationId xmlns:a16="http://schemas.microsoft.com/office/drawing/2014/main" id="{E2D33970-FE8B-4A0A-AD13-6F0D6F5FB73A}"/>
-              </a:ext>
-            </a:extLst>
-          </p:cNvPr>
-          <p:cNvPicPr>
-            <a:picLocks noChangeAspect="1" noChangeArrowheads="1"/>
-          </p:cNvPicPr>
-          <p:nvPr/>
-        </p:nvPicPr>
-        <p:blipFill>
-          <a:blip r:embed="rId2">
-            <a:extLst>
-              <a:ext uri="{28A0092B-C50C-407E-A947-70E740481C1C}">
-                <a14:useLocalDpi xmlns:a14="http://schemas.microsoft.com/office/drawing/2010/main" val="0"/>
-              </a:ext>
-            </a:extLst>
-          </a:blip>
-          <a:srcRect/>
-          <a:stretch>
-            <a:fillRect/>
-          </a:stretch>
-        </p:blipFill>
-        <p:spPr bwMode="auto">
-          <a:xfrm>
-            <a:off x="3238499" y="95880"/>
-            <a:ext cx="5715000" cy="2219325"/>
-          </a:xfrm>
-          <a:prstGeom prst="rect">
-            <a:avLst/>
-          </a:prstGeom>
-          <a:noFill/>
-          <a:extLst>
-            <a:ext uri="{909E8E84-426E-40DD-AFC4-6F175D3DCCD1}">
-              <a14:hiddenFill xmlns:a14="http://schemas.microsoft.com/office/drawing/2010/main">
-                <a:solidFill>
-                  <a:srgbClr val="FFFFFF"/>
-                </a:solidFill>
-              </a14:hiddenFill>
-            </a:ext>
-          </a:extLst>
-        </p:spPr>
-      </p:pic>
       <p:sp>
         <p:nvSpPr>
           <p:cNvPr id="2" name="name">
@@ -6984,6 +6624,7 @@
           </a:bodyPr>
           <a:lstStyle/>
           <a:p>
+            <a:pPr algn="ctr"/>
             <a:r>
               <a:rPr lang="ko-KR" altLang="en-US" sz="16800" b="1" spc="5000" dirty="0">
                 <a:solidFill>
@@ -7053,10 +6694,34 @@
           </a:p>
         </p:txBody>
       </p:sp>
+      <p:pic>
+        <p:nvPicPr>
+          <p:cNvPr id="9" name="Picture 8" descr="image.jpeg"/>
+          <p:cNvPicPr>
+            <a:picLocks noChangeAspect="1"/>
+          </p:cNvPicPr>
+          <p:nvPr/>
+        </p:nvPicPr>
+        <p:blipFill>
+          <a:blip r:embed="rId2"/>
+          <a:stretch>
+            <a:fillRect/>
+          </a:stretch>
+        </p:blipFill>
+        <p:spPr>
+          <a:xfrm>
+            <a:off x="3238499" y="95880"/>
+            <a:ext cx="5715000" cy="2219325"/>
+          </a:xfrm>
+          <a:prstGeom prst="rect">
+            <a:avLst/>
+          </a:prstGeom>
+        </p:spPr>
+      </p:pic>
     </p:spTree>
     <p:extLst>
       <p:ext uri="{BB962C8B-B14F-4D97-AF65-F5344CB8AC3E}">
-        <p14:creationId xmlns:p14="http://schemas.microsoft.com/office/powerpoint/2010/main" val="2031236678"/>
+        <p14:creationId xmlns:p14="http://schemas.microsoft.com/office/powerpoint/2010/main" val="2029591095"/>
       </p:ext>
     </p:extLst>
   </p:cSld>

</xml_diff>